<commit_message>
Add concurrent connections slide
</commit_message>
<xml_diff>
--- a/Building the Real-time Web with SignalR.pptx
+++ b/Building the Real-time Web with SignalR.pptx
@@ -5,10 +5,10 @@
     <p:sldMasterId id="2147483864" r:id="rId4"/>
   </p:sldMasterIdLst>
   <p:notesMasterIdLst>
-    <p:notesMasterId r:id="rId17"/>
+    <p:notesMasterId r:id="rId18"/>
   </p:notesMasterIdLst>
   <p:handoutMasterIdLst>
-    <p:handoutMasterId r:id="rId18"/>
+    <p:handoutMasterId r:id="rId19"/>
   </p:handoutMasterIdLst>
   <p:sldIdLst>
     <p:sldId id="3782" r:id="rId5"/>
@@ -20,9 +20,10 @@
     <p:sldId id="3774" r:id="rId11"/>
     <p:sldId id="3776" r:id="rId12"/>
     <p:sldId id="3775" r:id="rId13"/>
-    <p:sldId id="3785" r:id="rId14"/>
-    <p:sldId id="3786" r:id="rId15"/>
-    <p:sldId id="326" r:id="rId16"/>
+    <p:sldId id="3787" r:id="rId14"/>
+    <p:sldId id="3788" r:id="rId15"/>
+    <p:sldId id="3789" r:id="rId16"/>
+    <p:sldId id="326" r:id="rId17"/>
   </p:sldIdLst>
   <p:sldSz cx="12436475" cy="6994525"/>
   <p:notesSz cx="6858000" cy="9144000"/>
@@ -135,8 +136,9 @@
             <p14:sldId id="3774"/>
             <p14:sldId id="3776"/>
             <p14:sldId id="3775"/>
-            <p14:sldId id="3785"/>
-            <p14:sldId id="3786"/>
+            <p14:sldId id="3787"/>
+            <p14:sldId id="3788"/>
+            <p14:sldId id="3789"/>
             <p14:sldId id="326"/>
           </p14:sldIdLst>
         </p14:section>
@@ -923,15 +925,7 @@
             </a:pPr>
             <a:r>
               <a:rPr lang="en-US" dirty="0"/>
-              <a:t>Decouple </a:t>
-            </a:r>
-            <a:r>
-              <a:rPr lang="en-US" dirty="0" err="1"/>
-              <a:t>SignalR</a:t>
-            </a:r>
-            <a:r>
-              <a:rPr lang="en-US" dirty="0"/>
-              <a:t> connections from the ASP.NET Core app</a:t>
+              <a:t>All traffic hits the same app</a:t>
             </a:r>
           </a:p>
           <a:p>
@@ -941,7 +935,7 @@
             </a:pPr>
             <a:r>
               <a:rPr lang="en-US" dirty="0"/>
-              <a:t>No backplane needed w/ </a:t>
+              <a:t>App Service limits the # of concurrent connections (</a:t>
             </a:r>
             <a:r>
               <a:rPr lang="en-US" dirty="0" err="1"/>
@@ -949,8 +943,22 @@
             </a:r>
             <a:r>
               <a:rPr lang="en-US" dirty="0"/>
-              <a:t> Service (uses Redis backplane behind the scenes)</a:t>
-            </a:r>
+              <a:t> Service solves this)</a:t>
+            </a:r>
+          </a:p>
+          <a:p>
+            <a:pPr marL="285750" indent="-285750">
+              <a:buFontTx/>
+              <a:buChar char="-"/>
+            </a:pPr>
+            <a:endParaRPr lang="en-US" dirty="0"/>
+          </a:p>
+          <a:p>
+            <a:pPr marL="285750" indent="-285750">
+              <a:buFontTx/>
+              <a:buChar char="-"/>
+            </a:pPr>
+            <a:endParaRPr lang="en-US" dirty="0"/>
           </a:p>
         </p:txBody>
       </p:sp>
@@ -980,7 +988,7 @@
     </p:spTree>
     <p:extLst>
       <p:ext uri="{BB962C8B-B14F-4D97-AF65-F5344CB8AC3E}">
-        <p14:creationId xmlns:p14="http://schemas.microsoft.com/office/powerpoint/2010/main" val="4231234210"/>
+        <p14:creationId xmlns:p14="http://schemas.microsoft.com/office/powerpoint/2010/main" val="13806265"/>
       </p:ext>
     </p:extLst>
   </p:cSld>
@@ -1034,6 +1042,108 @@
           <a:bodyPr/>
           <a:lstStyle/>
           <a:p>
+            <a:pPr marL="0" indent="0">
+              <a:buFontTx/>
+              <a:buNone/>
+            </a:pPr>
+            <a:r>
+              <a:rPr lang="en-US" dirty="0"/>
+              <a:t>- Recommend </a:t>
+            </a:r>
+            <a:r>
+              <a:rPr lang="en-US" dirty="0" err="1"/>
+              <a:t>SignalR</a:t>
+            </a:r>
+            <a:r>
+              <a:rPr lang="en-US" dirty="0"/>
+              <a:t> Service for PROD workloads</a:t>
+            </a:r>
+          </a:p>
+          <a:p>
+            <a:endParaRPr lang="en-US" dirty="0"/>
+          </a:p>
+        </p:txBody>
+      </p:sp>
+      <p:sp>
+        <p:nvSpPr>
+          <p:cNvPr id="4" name="Slide Number Placeholder 3"/>
+          <p:cNvSpPr>
+            <a:spLocks noGrp="1"/>
+          </p:cNvSpPr>
+          <p:nvPr>
+            <p:ph type="sldNum" sz="quarter" idx="5"/>
+          </p:nvPr>
+        </p:nvSpPr>
+        <p:spPr/>
+        <p:txBody>
+          <a:bodyPr/>
+          <a:lstStyle/>
+          <a:p>
+            <a:fld id="{3D7B9D4F-5F19-438C-92E8-037C6AE8F87D}" type="slidenum">
+              <a:rPr lang="en-US" smtClean="0"/>
+              <a:t>12</a:t>
+            </a:fld>
+            <a:endParaRPr lang="en-US"/>
+          </a:p>
+        </p:txBody>
+      </p:sp>
+    </p:spTree>
+    <p:extLst>
+      <p:ext uri="{BB962C8B-B14F-4D97-AF65-F5344CB8AC3E}">
+        <p14:creationId xmlns:p14="http://schemas.microsoft.com/office/powerpoint/2010/main" val="1081250580"/>
+      </p:ext>
+    </p:extLst>
+  </p:cSld>
+  <p:clrMapOvr>
+    <a:masterClrMapping/>
+  </p:clrMapOvr>
+</p:notes>
+</file>
+
+<file path=ppt/notesSlides/notesSlide12.xml><?xml version="1.0" encoding="utf-8"?>
+<p:notes xmlns:a="http://schemas.openxmlformats.org/drawingml/2006/main" xmlns:r="http://schemas.openxmlformats.org/officeDocument/2006/relationships" xmlns:p="http://schemas.openxmlformats.org/presentationml/2006/main">
+  <p:cSld>
+    <p:spTree>
+      <p:nvGrpSpPr>
+        <p:cNvPr id="1" name=""/>
+        <p:cNvGrpSpPr/>
+        <p:nvPr/>
+      </p:nvGrpSpPr>
+      <p:grpSpPr>
+        <a:xfrm>
+          <a:off x="0" y="0"/>
+          <a:ext cx="0" cy="0"/>
+          <a:chOff x="0" y="0"/>
+          <a:chExt cx="0" cy="0"/>
+        </a:xfrm>
+      </p:grpSpPr>
+      <p:sp>
+        <p:nvSpPr>
+          <p:cNvPr id="2" name="Slide Image Placeholder 1"/>
+          <p:cNvSpPr>
+            <a:spLocks noGrp="1" noRot="1" noChangeAspect="1"/>
+          </p:cNvSpPr>
+          <p:nvPr>
+            <p:ph type="sldImg"/>
+          </p:nvPr>
+        </p:nvSpPr>
+        <p:spPr/>
+      </p:sp>
+      <p:sp>
+        <p:nvSpPr>
+          <p:cNvPr id="3" name="Notes Placeholder 2"/>
+          <p:cNvSpPr>
+            <a:spLocks noGrp="1"/>
+          </p:cNvSpPr>
+          <p:nvPr>
+            <p:ph type="body" idx="1"/>
+          </p:nvPr>
+        </p:nvSpPr>
+        <p:spPr/>
+        <p:txBody>
+          <a:bodyPr/>
+          <a:lstStyle/>
+          <a:p>
             <a:endParaRPr lang="en-US" dirty="0"/>
           </a:p>
         </p:txBody>
@@ -1102,7 +1212,7 @@
                 <a:tabLst/>
                 <a:defRPr/>
               </a:pPr>
-              <a:t>12</a:t>
+              <a:t>13</a:t>
             </a:fld>
             <a:endParaRPr kumimoji="0" lang="en-US" sz="1200" b="0" i="0" u="none" strike="noStrike" kern="1200" cap="none" spc="0" normalizeH="0" baseline="0" noProof="0">
               <a:ln>
@@ -1949,7 +2059,7 @@
     </p:spTree>
     <p:extLst>
       <p:ext uri="{BB962C8B-B14F-4D97-AF65-F5344CB8AC3E}">
-        <p14:creationId xmlns:p14="http://schemas.microsoft.com/office/powerpoint/2010/main" val="1874177105"/>
+        <p14:creationId xmlns:p14="http://schemas.microsoft.com/office/powerpoint/2010/main" val="2129708457"/>
       </p:ext>
     </p:extLst>
   </p:cSld>
@@ -17163,7 +17273,7 @@
         </p:blipFill>
         <p:spPr bwMode="auto">
           <a:xfrm>
-            <a:off x="-3247397" y="-2686061"/>
+            <a:off x="-1997331" y="-2153626"/>
             <a:ext cx="15391772" cy="10392735"/>
           </a:xfrm>
           <a:prstGeom prst="rect">
@@ -17212,7 +17322,7 @@
         </p:nvSpPr>
         <p:spPr>
           <a:xfrm>
-            <a:off x="434975" y="1142881"/>
+            <a:off x="1685041" y="1675316"/>
             <a:ext cx="11567160" cy="276999"/>
           </a:xfrm>
         </p:spPr>
@@ -17255,9 +17365,7 @@
             <a:r>
               <a:rPr lang="en-US" dirty="0">
                 <a:ln w="12700">
-                  <a:solidFill>
-                    <a:schemeClr val="bg1"/>
-                  </a:solidFill>
+                  <a:noFill/>
                 </a:ln>
               </a:rPr>
               <a:t>scale-out</a:t>
@@ -17279,7 +17387,7 @@
         </p:nvSpPr>
         <p:spPr bwMode="auto">
           <a:xfrm>
-            <a:off x="434340" y="1544638"/>
+            <a:off x="1684406" y="2077073"/>
             <a:ext cx="3562350" cy="2066925"/>
           </a:xfrm>
           <a:prstGeom prst="roundRect">
@@ -17395,7 +17503,7 @@
         </p:nvSpPr>
         <p:spPr bwMode="auto">
           <a:xfrm>
-            <a:off x="638175" y="2643079"/>
+            <a:off x="1888241" y="3175514"/>
             <a:ext cx="1370013" cy="733534"/>
           </a:xfrm>
           <a:prstGeom prst="roundRect">
@@ -17464,7 +17572,7 @@
         </p:nvSpPr>
         <p:spPr bwMode="auto">
           <a:xfrm>
-            <a:off x="2408238" y="2643079"/>
+            <a:off x="3658304" y="3175514"/>
             <a:ext cx="1370013" cy="733534"/>
           </a:xfrm>
           <a:prstGeom prst="roundRect">
@@ -17541,7 +17649,7 @@
         </p:blipFill>
         <p:spPr>
           <a:xfrm>
-            <a:off x="2408238" y="4146572"/>
+            <a:off x="3658304" y="4679007"/>
             <a:ext cx="2211030" cy="2008275"/>
           </a:xfrm>
           <a:prstGeom prst="rect">
@@ -17571,7 +17679,7 @@
         </p:nvCxnSpPr>
         <p:spPr>
           <a:xfrm rot="16200000" flipH="1">
-            <a:off x="978662" y="3721133"/>
+            <a:off x="2228728" y="4253568"/>
             <a:ext cx="1774097" cy="1085056"/>
           </a:xfrm>
           <a:prstGeom prst="curvedConnector2">
@@ -17617,7 +17725,7 @@
         </p:nvCxnSpPr>
         <p:spPr>
           <a:xfrm rot="5400000">
-            <a:off x="1833731" y="3951121"/>
+            <a:off x="3083797" y="4483556"/>
             <a:ext cx="1774097" cy="625081"/>
           </a:xfrm>
           <a:prstGeom prst="curvedConnector4">
@@ -17663,7 +17771,7 @@
         </p:nvSpPr>
         <p:spPr>
           <a:xfrm>
-            <a:off x="2739260" y="4670577"/>
+            <a:off x="3989326" y="5203012"/>
             <a:ext cx="1551491" cy="627864"/>
           </a:xfrm>
           <a:prstGeom prst="rect">
@@ -17710,7 +17818,7 @@
         </p:nvSpPr>
         <p:spPr>
           <a:xfrm>
-            <a:off x="2184008" y="3844199"/>
+            <a:off x="3434074" y="4376634"/>
             <a:ext cx="2372554" cy="871008"/>
           </a:xfrm>
           <a:prstGeom prst="rect">
@@ -17804,7 +17912,7 @@
         </p:nvSpPr>
         <p:spPr>
           <a:xfrm>
-            <a:off x="698101" y="3935049"/>
+            <a:off x="1948167" y="4467484"/>
             <a:ext cx="1185051" cy="871008"/>
           </a:xfrm>
           <a:prstGeom prst="rect">
@@ -17874,7 +17982,7 @@
     </p:spTree>
     <p:extLst>
       <p:ext uri="{BB962C8B-B14F-4D97-AF65-F5344CB8AC3E}">
-        <p14:creationId xmlns:p14="http://schemas.microsoft.com/office/powerpoint/2010/main" val="748713960"/>
+        <p14:creationId xmlns:p14="http://schemas.microsoft.com/office/powerpoint/2010/main" val="2098257646"/>
       </p:ext>
     </p:extLst>
   </p:cSld>
@@ -17933,7 +18041,7 @@
         </p:blipFill>
         <p:spPr bwMode="auto">
           <a:xfrm>
-            <a:off x="-3247397" y="-2686061"/>
+            <a:off x="-1997331" y="-2153626"/>
             <a:ext cx="15391772" cy="10392735"/>
           </a:xfrm>
           <a:prstGeom prst="rect">
@@ -17982,7 +18090,7 @@
         </p:nvSpPr>
         <p:spPr>
           <a:xfrm>
-            <a:off x="434975" y="1142881"/>
+            <a:off x="1685041" y="1675316"/>
             <a:ext cx="11567160" cy="276999"/>
           </a:xfrm>
         </p:spPr>
@@ -18027,14 +18135,16 @@
           <a:lstStyle/>
           <a:p>
             <a:r>
+              <a:rPr lang="en-US" dirty="0"/>
+              <a:t>A better </a:t>
+            </a:r>
+            <a:r>
               <a:rPr lang="en-US" dirty="0">
                 <a:ln w="12700">
-                  <a:solidFill>
-                    <a:schemeClr val="bg1"/>
-                  </a:solidFill>
+                  <a:noFill/>
                 </a:ln>
               </a:rPr>
-              <a:t>A simpler scale-out solution</a:t>
+              <a:t>scale-out solution</a:t>
             </a:r>
           </a:p>
         </p:txBody>
@@ -18053,7 +18163,7 @@
         </p:nvSpPr>
         <p:spPr bwMode="auto">
           <a:xfrm>
-            <a:off x="434340" y="1544638"/>
+            <a:off x="1684406" y="2077073"/>
             <a:ext cx="3562350" cy="2066925"/>
           </a:xfrm>
           <a:prstGeom prst="roundRect">
@@ -18169,7 +18279,7 @@
         </p:nvSpPr>
         <p:spPr bwMode="auto">
           <a:xfrm>
-            <a:off x="638175" y="2643079"/>
+            <a:off x="1888241" y="3175514"/>
             <a:ext cx="1370013" cy="733534"/>
           </a:xfrm>
           <a:prstGeom prst="roundRect">
@@ -18238,7 +18348,7 @@
         </p:nvSpPr>
         <p:spPr bwMode="auto">
           <a:xfrm>
-            <a:off x="2408238" y="2643079"/>
+            <a:off x="3658304" y="3175514"/>
             <a:ext cx="1370013" cy="733534"/>
           </a:xfrm>
           <a:prstGeom prst="roundRect">
@@ -18288,7 +18398,7 @@
                 <a:ea typeface="Segoe UI" pitchFamily="34" charset="0"/>
                 <a:cs typeface="Segoe UI" pitchFamily="34" charset="0"/>
               </a:rPr>
-              <a:t>Hub</a:t>
+              <a:t>Hubs</a:t>
             </a:r>
           </a:p>
         </p:txBody>
@@ -18315,7 +18425,7 @@
         </p:blipFill>
         <p:spPr>
           <a:xfrm>
-            <a:off x="2408238" y="4146572"/>
+            <a:off x="3658304" y="4679007"/>
             <a:ext cx="2211030" cy="2008275"/>
           </a:xfrm>
           <a:prstGeom prst="rect">
@@ -18345,7 +18455,7 @@
         </p:nvCxnSpPr>
         <p:spPr>
           <a:xfrm rot="16200000" flipH="1">
-            <a:off x="978662" y="3721133"/>
+            <a:off x="2228728" y="4253568"/>
             <a:ext cx="1774097" cy="1085056"/>
           </a:xfrm>
           <a:prstGeom prst="curvedConnector2">
@@ -18388,7 +18498,7 @@
         </p:nvSpPr>
         <p:spPr>
           <a:xfrm>
-            <a:off x="2739260" y="4670577"/>
+            <a:off x="3989326" y="5203012"/>
             <a:ext cx="1551491" cy="627864"/>
           </a:xfrm>
           <a:prstGeom prst="rect">
@@ -18417,100 +18527,6 @@
                 </a:solidFill>
               </a:rPr>
               <a:t>Client</a:t>
-            </a:r>
-          </a:p>
-        </p:txBody>
-      </p:sp>
-      <p:sp>
-        <p:nvSpPr>
-          <p:cNvPr id="32" name="TextBox 31">
-            <a:extLst>
-              <a:ext uri="{FF2B5EF4-FFF2-40B4-BE49-F238E27FC236}">
-                <a16:creationId xmlns:a16="http://schemas.microsoft.com/office/drawing/2014/main" id="{02B7147B-5685-460D-B6B3-1D16E784051D}"/>
-              </a:ext>
-            </a:extLst>
-          </p:cNvPr>
-          <p:cNvSpPr txBox="1"/>
-          <p:nvPr/>
-        </p:nvSpPr>
-        <p:spPr>
-          <a:xfrm>
-            <a:off x="6352510" y="3981238"/>
-            <a:ext cx="2372554" cy="871008"/>
-          </a:xfrm>
-          <a:prstGeom prst="rect">
-            <a:avLst/>
-          </a:prstGeom>
-          <a:noFill/>
-        </p:spPr>
-        <p:txBody>
-          <a:bodyPr wrap="square" lIns="182880" tIns="146304" rIns="182880" bIns="146304" rtlCol="0">
-            <a:spAutoFit/>
-          </a:bodyPr>
-          <a:lstStyle/>
-          <a:p>
-            <a:pPr>
-              <a:lnSpc>
-                <a:spcPct val="90000"/>
-              </a:lnSpc>
-              <a:spcAft>
-                <a:spcPts val="600"/>
-              </a:spcAft>
-            </a:pPr>
-            <a:r>
-              <a:rPr lang="en-US" sz="1800" dirty="0" err="1">
-                <a:gradFill>
-                  <a:gsLst>
-                    <a:gs pos="2917">
-                      <a:schemeClr val="tx1"/>
-                    </a:gs>
-                    <a:gs pos="30000">
-                      <a:schemeClr val="tx1"/>
-                    </a:gs>
-                  </a:gsLst>
-                  <a:lin ang="5400000" scaled="0"/>
-                </a:gradFill>
-              </a:rPr>
-              <a:t>SignalR</a:t>
-            </a:r>
-            <a:endParaRPr lang="en-US" sz="1800" dirty="0">
-              <a:gradFill>
-                <a:gsLst>
-                  <a:gs pos="2917">
-                    <a:schemeClr val="tx1"/>
-                  </a:gs>
-                  <a:gs pos="30000">
-                    <a:schemeClr val="tx1"/>
-                  </a:gs>
-                </a:gsLst>
-                <a:lin ang="5400000" scaled="0"/>
-              </a:gradFill>
-            </a:endParaRPr>
-          </a:p>
-          <a:p>
-            <a:pPr>
-              <a:lnSpc>
-                <a:spcPct val="90000"/>
-              </a:lnSpc>
-              <a:spcAft>
-                <a:spcPts val="600"/>
-              </a:spcAft>
-            </a:pPr>
-            <a:r>
-              <a:rPr lang="en-US" sz="1800" dirty="0">
-                <a:gradFill>
-                  <a:gsLst>
-                    <a:gs pos="2917">
-                      <a:schemeClr val="tx1"/>
-                    </a:gs>
-                    <a:gs pos="30000">
-                      <a:schemeClr val="tx1"/>
-                    </a:gs>
-                  </a:gsLst>
-                  <a:lin ang="5400000" scaled="0"/>
-                </a:gradFill>
-              </a:rPr>
-              <a:t>traffic</a:t>
             </a:r>
           </a:p>
         </p:txBody>
@@ -18529,7 +18545,7 @@
         </p:nvSpPr>
         <p:spPr>
           <a:xfrm>
-            <a:off x="698101" y="3935049"/>
+            <a:off x="1948167" y="4467484"/>
             <a:ext cx="1185051" cy="871008"/>
           </a:xfrm>
           <a:prstGeom prst="rect">
@@ -18598,10 +18614,104 @@
       </p:sp>
       <p:sp>
         <p:nvSpPr>
-          <p:cNvPr id="14" name="Rectangle: Rounded Corners 13">
+          <p:cNvPr id="14" name="TextBox 13">
             <a:extLst>
               <a:ext uri="{FF2B5EF4-FFF2-40B4-BE49-F238E27FC236}">
-                <a16:creationId xmlns:a16="http://schemas.microsoft.com/office/drawing/2014/main" id="{FAEC1A70-F8C8-474C-9B86-7CEF01BF5E85}"/>
+                <a16:creationId xmlns:a16="http://schemas.microsoft.com/office/drawing/2014/main" id="{E6DB530A-E020-498D-9BD6-881FD6F17E6D}"/>
+              </a:ext>
+            </a:extLst>
+          </p:cNvPr>
+          <p:cNvSpPr txBox="1"/>
+          <p:nvPr/>
+        </p:nvSpPr>
+        <p:spPr>
+          <a:xfrm>
+            <a:off x="7617628" y="4550972"/>
+            <a:ext cx="2372554" cy="871008"/>
+          </a:xfrm>
+          <a:prstGeom prst="rect">
+            <a:avLst/>
+          </a:prstGeom>
+          <a:noFill/>
+        </p:spPr>
+        <p:txBody>
+          <a:bodyPr wrap="square" lIns="182880" tIns="146304" rIns="182880" bIns="146304" rtlCol="0">
+            <a:spAutoFit/>
+          </a:bodyPr>
+          <a:lstStyle/>
+          <a:p>
+            <a:pPr>
+              <a:lnSpc>
+                <a:spcPct val="90000"/>
+              </a:lnSpc>
+              <a:spcAft>
+                <a:spcPts val="600"/>
+              </a:spcAft>
+            </a:pPr>
+            <a:r>
+              <a:rPr lang="en-US" sz="1800" dirty="0" err="1">
+                <a:gradFill>
+                  <a:gsLst>
+                    <a:gs pos="2917">
+                      <a:schemeClr val="tx1"/>
+                    </a:gs>
+                    <a:gs pos="30000">
+                      <a:schemeClr val="tx1"/>
+                    </a:gs>
+                  </a:gsLst>
+                  <a:lin ang="5400000" scaled="0"/>
+                </a:gradFill>
+              </a:rPr>
+              <a:t>SignalR</a:t>
+            </a:r>
+            <a:endParaRPr lang="en-US" sz="1800" dirty="0">
+              <a:gradFill>
+                <a:gsLst>
+                  <a:gs pos="2917">
+                    <a:schemeClr val="tx1"/>
+                  </a:gs>
+                  <a:gs pos="30000">
+                    <a:schemeClr val="tx1"/>
+                  </a:gs>
+                </a:gsLst>
+                <a:lin ang="5400000" scaled="0"/>
+              </a:gradFill>
+            </a:endParaRPr>
+          </a:p>
+          <a:p>
+            <a:pPr>
+              <a:lnSpc>
+                <a:spcPct val="90000"/>
+              </a:lnSpc>
+              <a:spcAft>
+                <a:spcPts val="600"/>
+              </a:spcAft>
+            </a:pPr>
+            <a:r>
+              <a:rPr lang="en-US" sz="1800" dirty="0">
+                <a:gradFill>
+                  <a:gsLst>
+                    <a:gs pos="2917">
+                      <a:schemeClr val="tx1"/>
+                    </a:gs>
+                    <a:gs pos="30000">
+                      <a:schemeClr val="tx1"/>
+                    </a:gs>
+                  </a:gsLst>
+                  <a:lin ang="5400000" scaled="0"/>
+                </a:gradFill>
+              </a:rPr>
+              <a:t>traffic</a:t>
+            </a:r>
+          </a:p>
+        </p:txBody>
+      </p:sp>
+      <p:sp>
+        <p:nvSpPr>
+          <p:cNvPr id="15" name="Rectangle: Rounded Corners 14">
+            <a:extLst>
+              <a:ext uri="{FF2B5EF4-FFF2-40B4-BE49-F238E27FC236}">
+                <a16:creationId xmlns:a16="http://schemas.microsoft.com/office/drawing/2014/main" id="{7A5DF399-6146-44E9-9D73-62303FEE4116}"/>
               </a:ext>
             </a:extLst>
           </p:cNvPr>
@@ -18610,7 +18720,7 @@
         </p:nvSpPr>
         <p:spPr bwMode="auto">
           <a:xfrm>
-            <a:off x="4989867" y="1507339"/>
+            <a:off x="6254985" y="2077073"/>
             <a:ext cx="3562350" cy="2066925"/>
           </a:xfrm>
           <a:prstGeom prst="roundRect">
@@ -18680,10 +18790,10 @@
       </p:sp>
       <p:sp>
         <p:nvSpPr>
-          <p:cNvPr id="15" name="Rectangle: Rounded Corners 14">
+          <p:cNvPr id="16" name="Rectangle: Rounded Corners 15">
             <a:extLst>
               <a:ext uri="{FF2B5EF4-FFF2-40B4-BE49-F238E27FC236}">
-                <a16:creationId xmlns:a16="http://schemas.microsoft.com/office/drawing/2014/main" id="{2F20B8AF-8F1C-466F-8E9C-3A7A8F7F2656}"/>
+                <a16:creationId xmlns:a16="http://schemas.microsoft.com/office/drawing/2014/main" id="{03F6B38C-22BE-47F4-9AF5-6067BC1E3D86}"/>
               </a:ext>
             </a:extLst>
           </p:cNvPr>
@@ -18692,7 +18802,7 @@
         </p:nvSpPr>
         <p:spPr bwMode="auto">
           <a:xfrm>
-            <a:off x="5208755" y="2643078"/>
+            <a:off x="6473423" y="3172604"/>
             <a:ext cx="1370013" cy="733534"/>
           </a:xfrm>
           <a:prstGeom prst="roundRect">
@@ -18749,10 +18859,10 @@
       </p:sp>
       <p:sp>
         <p:nvSpPr>
-          <p:cNvPr id="16" name="Rectangle: Rounded Corners 15">
+          <p:cNvPr id="17" name="Rectangle: Rounded Corners 16">
             <a:extLst>
               <a:ext uri="{FF2B5EF4-FFF2-40B4-BE49-F238E27FC236}">
-                <a16:creationId xmlns:a16="http://schemas.microsoft.com/office/drawing/2014/main" id="{9B86818C-76D4-425E-8FA7-38F1E66C6A2B}"/>
+                <a16:creationId xmlns:a16="http://schemas.microsoft.com/office/drawing/2014/main" id="{E6ECA177-C292-4479-934D-28C2D2EED5D7}"/>
               </a:ext>
             </a:extLst>
           </p:cNvPr>
@@ -18761,7 +18871,7 @@
         </p:nvSpPr>
         <p:spPr bwMode="auto">
           <a:xfrm>
-            <a:off x="6978818" y="2643078"/>
+            <a:off x="8243486" y="3172604"/>
             <a:ext cx="1370013" cy="733534"/>
           </a:xfrm>
           <a:prstGeom prst="roundRect">
@@ -18818,10 +18928,10 @@
       </p:sp>
       <p:cxnSp>
         <p:nvCxnSpPr>
-          <p:cNvPr id="17" name="Connector: Curved 16">
+          <p:cNvPr id="18" name="Connector: Curved 17">
             <a:extLst>
               <a:ext uri="{FF2B5EF4-FFF2-40B4-BE49-F238E27FC236}">
-                <a16:creationId xmlns:a16="http://schemas.microsoft.com/office/drawing/2014/main" id="{40F468B3-A54E-4EFB-B31B-EBE76CC53B37}"/>
+                <a16:creationId xmlns:a16="http://schemas.microsoft.com/office/drawing/2014/main" id="{413357AA-6400-45BF-93E3-CA6EA6AAC1DA}"/>
               </a:ext>
             </a:extLst>
           </p:cNvPr>
@@ -18832,7 +18942,7 @@
         </p:nvCxnSpPr>
         <p:spPr>
           <a:xfrm rot="10800000" flipV="1">
-            <a:off x="4439634" y="3376611"/>
+            <a:off x="5704752" y="3946345"/>
             <a:ext cx="3238795" cy="1774097"/>
           </a:xfrm>
           <a:prstGeom prst="curvedConnector3">
@@ -18865,23 +18975,23 @@
       </p:cxnSp>
       <p:cxnSp>
         <p:nvCxnSpPr>
-          <p:cNvPr id="11" name="Straight Arrow Connector 10">
+          <p:cNvPr id="6" name="Straight Arrow Connector 5">
             <a:extLst>
               <a:ext uri="{FF2B5EF4-FFF2-40B4-BE49-F238E27FC236}">
-                <a16:creationId xmlns:a16="http://schemas.microsoft.com/office/drawing/2014/main" id="{3D44922D-6C12-4DB1-A1FE-C718BE92FF24}"/>
+                <a16:creationId xmlns:a16="http://schemas.microsoft.com/office/drawing/2014/main" id="{C3DCF460-35F7-4877-AA75-FAD25183DCD7}"/>
               </a:ext>
             </a:extLst>
           </p:cNvPr>
           <p:cNvCxnSpPr>
-            <a:stCxn id="8" idx="3"/>
-            <a:endCxn id="15" idx="1"/>
+            <a:cxnSpLocks/>
+            <a:endCxn id="16" idx="1"/>
           </p:cNvCxnSpPr>
           <p:nvPr/>
         </p:nvCxnSpPr>
         <p:spPr>
-          <a:xfrm flipV="1">
-            <a:off x="3778251" y="3009845"/>
-            <a:ext cx="1430504" cy="1"/>
+          <a:xfrm>
+            <a:off x="5028317" y="3539371"/>
+            <a:ext cx="1445106" cy="0"/>
           </a:xfrm>
           <a:prstGeom prst="straightConnector1">
             <a:avLst/>
@@ -18912,7 +19022,7 @@
     </p:spTree>
     <p:extLst>
       <p:ext uri="{BB962C8B-B14F-4D97-AF65-F5344CB8AC3E}">
-        <p14:creationId xmlns:p14="http://schemas.microsoft.com/office/powerpoint/2010/main" val="895204585"/>
+        <p14:creationId xmlns:p14="http://schemas.microsoft.com/office/powerpoint/2010/main" val="270777829"/>
       </p:ext>
     </p:extLst>
   </p:cSld>
@@ -18926,6 +19036,1148 @@
 </file>
 
 <file path=ppt/slides/slide12.xml><?xml version="1.0" encoding="utf-8"?>
+<p:sld xmlns:a="http://schemas.openxmlformats.org/drawingml/2006/main" xmlns:r="http://schemas.openxmlformats.org/officeDocument/2006/relationships" xmlns:p="http://schemas.openxmlformats.org/presentationml/2006/main">
+  <p:cSld>
+    <p:spTree>
+      <p:nvGrpSpPr>
+        <p:cNvPr id="1" name=""/>
+        <p:cNvGrpSpPr/>
+        <p:nvPr/>
+      </p:nvGrpSpPr>
+      <p:grpSpPr>
+        <a:xfrm>
+          <a:off x="0" y="0"/>
+          <a:ext cx="0" cy="0"/>
+          <a:chOff x="0" y="0"/>
+          <a:chExt cx="0" cy="0"/>
+        </a:xfrm>
+      </p:grpSpPr>
+      <p:pic>
+        <p:nvPicPr>
+          <p:cNvPr id="1026" name="Picture 2" descr="Image result for Azure SignalR Service logo">
+            <a:extLst>
+              <a:ext uri="{FF2B5EF4-FFF2-40B4-BE49-F238E27FC236}">
+                <a16:creationId xmlns:a16="http://schemas.microsoft.com/office/drawing/2014/main" id="{B62B6923-2395-4F12-B1E9-A931D570FC99}"/>
+              </a:ext>
+            </a:extLst>
+          </p:cNvPr>
+          <p:cNvPicPr>
+            <a:picLocks noChangeAspect="1" noChangeArrowheads="1"/>
+          </p:cNvPicPr>
+          <p:nvPr/>
+        </p:nvPicPr>
+        <p:blipFill>
+          <a:blip r:embed="rId3">
+            <a:extLst>
+              <a:ext uri="{28A0092B-C50C-407E-A947-70E740481C1C}">
+                <a14:useLocalDpi xmlns:a14="http://schemas.microsoft.com/office/drawing/2010/main" val="0"/>
+              </a:ext>
+            </a:extLst>
+          </a:blip>
+          <a:srcRect/>
+          <a:stretch>
+            <a:fillRect/>
+          </a:stretch>
+        </p:blipFill>
+        <p:spPr bwMode="auto">
+          <a:xfrm>
+            <a:off x="201154" y="2729277"/>
+            <a:ext cx="1404595" cy="1404595"/>
+          </a:xfrm>
+          <a:prstGeom prst="rect">
+            <a:avLst/>
+          </a:prstGeom>
+          <a:noFill/>
+          <a:extLst>
+            <a:ext uri="{909E8E84-426E-40DD-AFC4-6F175D3DCCD1}">
+              <a14:hiddenFill xmlns:a14="http://schemas.microsoft.com/office/drawing/2010/main">
+                <a:solidFill>
+                  <a:srgbClr val="FFFFFF"/>
+                </a:solidFill>
+              </a14:hiddenFill>
+            </a:ext>
+          </a:extLst>
+        </p:spPr>
+      </p:pic>
+      <p:sp>
+        <p:nvSpPr>
+          <p:cNvPr id="2" name="Text Placeholder 1">
+            <a:extLst>
+              <a:ext uri="{FF2B5EF4-FFF2-40B4-BE49-F238E27FC236}">
+                <a16:creationId xmlns:a16="http://schemas.microsoft.com/office/drawing/2014/main" id="{F4636DF8-C7A2-453B-B256-B48AB8E676A8}"/>
+              </a:ext>
+            </a:extLst>
+          </p:cNvPr>
+          <p:cNvSpPr>
+            <a:spLocks noGrp="1"/>
+          </p:cNvSpPr>
+          <p:nvPr>
+            <p:ph type="body" sz="quarter" idx="10"/>
+          </p:nvPr>
+        </p:nvSpPr>
+        <p:spPr>
+          <a:xfrm>
+            <a:off x="434975" y="1142881"/>
+            <a:ext cx="11567160" cy="3200876"/>
+          </a:xfrm>
+        </p:spPr>
+        <p:txBody>
+          <a:bodyPr/>
+          <a:lstStyle/>
+          <a:p>
+            <a:r>
+              <a:rPr lang="en-US" dirty="0"/>
+              <a:t>	Azure App Service</a:t>
+            </a:r>
+          </a:p>
+          <a:p>
+            <a:r>
+              <a:rPr lang="en-US" dirty="0"/>
+              <a:t>	3 Basic instances = </a:t>
+            </a:r>
+            <a:r>
+              <a:rPr lang="en-US" sz="2400" dirty="0"/>
+              <a:t>1,050</a:t>
+            </a:r>
+            <a:r>
+              <a:rPr lang="en-US" dirty="0"/>
+              <a:t> concurrent</a:t>
+            </a:r>
+          </a:p>
+          <a:p>
+            <a:r>
+              <a:rPr lang="en-US" dirty="0"/>
+              <a:t>		@ ~$0.23 / hr.</a:t>
+            </a:r>
+          </a:p>
+          <a:p>
+            <a:endParaRPr lang="en-US" dirty="0"/>
+          </a:p>
+          <a:p>
+            <a:r>
+              <a:rPr lang="en-US" dirty="0"/>
+              <a:t>	Azure </a:t>
+            </a:r>
+            <a:r>
+              <a:rPr lang="en-US" dirty="0" err="1"/>
+              <a:t>SignalR</a:t>
+            </a:r>
+            <a:r>
+              <a:rPr lang="en-US" dirty="0"/>
+              <a:t> Service</a:t>
+            </a:r>
+          </a:p>
+          <a:p>
+            <a:r>
+              <a:rPr lang="en-US" dirty="0"/>
+              <a:t>	3 Standard instances = </a:t>
+            </a:r>
+            <a:r>
+              <a:rPr lang="en-US" sz="2400" dirty="0"/>
+              <a:t>3,000</a:t>
+            </a:r>
+            <a:r>
+              <a:rPr lang="en-US" dirty="0"/>
+              <a:t> concurrent</a:t>
+            </a:r>
+          </a:p>
+          <a:p>
+            <a:r>
+              <a:rPr lang="en-US" dirty="0"/>
+              <a:t>		@ ~$0.10 / hr.</a:t>
+            </a:r>
+          </a:p>
+        </p:txBody>
+      </p:sp>
+      <p:sp>
+        <p:nvSpPr>
+          <p:cNvPr id="3" name="Title 2">
+            <a:extLst>
+              <a:ext uri="{FF2B5EF4-FFF2-40B4-BE49-F238E27FC236}">
+                <a16:creationId xmlns:a16="http://schemas.microsoft.com/office/drawing/2014/main" id="{615040C6-BAB7-4241-95E7-5E99BBC497B0}"/>
+              </a:ext>
+            </a:extLst>
+          </p:cNvPr>
+          <p:cNvSpPr>
+            <a:spLocks noGrp="1"/>
+          </p:cNvSpPr>
+          <p:nvPr>
+            <p:ph type="title"/>
+          </p:nvPr>
+        </p:nvSpPr>
+        <p:spPr/>
+        <p:txBody>
+          <a:bodyPr/>
+          <a:lstStyle/>
+          <a:p>
+            <a:r>
+              <a:rPr lang="en-US" dirty="0"/>
+              <a:t>Concurrent connections in Azure</a:t>
+            </a:r>
+          </a:p>
+        </p:txBody>
+      </p:sp>
+      <p:graphicFrame>
+        <p:nvGraphicFramePr>
+          <p:cNvPr id="4" name="Table 3">
+            <a:extLst>
+              <a:ext uri="{FF2B5EF4-FFF2-40B4-BE49-F238E27FC236}">
+                <a16:creationId xmlns:a16="http://schemas.microsoft.com/office/drawing/2014/main" id="{76DC7F0C-8DD2-4FF8-8767-0EB06E6723F3}"/>
+              </a:ext>
+            </a:extLst>
+          </p:cNvPr>
+          <p:cNvGraphicFramePr>
+            <a:graphicFrameLocks noGrp="1"/>
+          </p:cNvGraphicFramePr>
+          <p:nvPr>
+            <p:extLst>
+              <p:ext uri="{D42A27DB-BD31-4B8C-83A1-F6EECF244321}">
+                <p14:modId xmlns:p14="http://schemas.microsoft.com/office/powerpoint/2010/main" val="1664455764"/>
+              </p:ext>
+            </p:extLst>
+          </p:nvPr>
+        </p:nvGraphicFramePr>
+        <p:xfrm>
+          <a:off x="6436403" y="1228844"/>
+          <a:ext cx="5473840" cy="4622800"/>
+        </p:xfrm>
+        <a:graphic>
+          <a:graphicData uri="http://schemas.openxmlformats.org/drawingml/2006/table">
+            <a:tbl>
+              <a:tblPr firstRow="1" bandRow="1">
+                <a:tableStyleId>{69CF1AB2-1976-4502-BF36-3FF5EA218861}</a:tableStyleId>
+              </a:tblPr>
+              <a:tblGrid>
+                <a:gridCol w="1146683">
+                  <a:extLst>
+                    <a:ext uri="{9D8B030D-6E8A-4147-A177-3AD203B41FA5}">
+                      <a16:colId xmlns:a16="http://schemas.microsoft.com/office/drawing/2014/main" val="633911240"/>
+                    </a:ext>
+                  </a:extLst>
+                </a:gridCol>
+                <a:gridCol w="1843532">
+                  <a:extLst>
+                    <a:ext uri="{9D8B030D-6E8A-4147-A177-3AD203B41FA5}">
+                      <a16:colId xmlns:a16="http://schemas.microsoft.com/office/drawing/2014/main" val="3252007508"/>
+                    </a:ext>
+                  </a:extLst>
+                </a:gridCol>
+                <a:gridCol w="1232218">
+                  <a:extLst>
+                    <a:ext uri="{9D8B030D-6E8A-4147-A177-3AD203B41FA5}">
+                      <a16:colId xmlns:a16="http://schemas.microsoft.com/office/drawing/2014/main" val="2503556833"/>
+                    </a:ext>
+                  </a:extLst>
+                </a:gridCol>
+                <a:gridCol w="1251407">
+                  <a:extLst>
+                    <a:ext uri="{9D8B030D-6E8A-4147-A177-3AD203B41FA5}">
+                      <a16:colId xmlns:a16="http://schemas.microsoft.com/office/drawing/2014/main" val="4234249319"/>
+                    </a:ext>
+                  </a:extLst>
+                </a:gridCol>
+              </a:tblGrid>
+              <a:tr h="370840">
+                <a:tc>
+                  <a:txBody>
+                    <a:bodyPr/>
+                    <a:lstStyle/>
+                    <a:p>
+                      <a:r>
+                        <a:rPr lang="en-US" dirty="0"/>
+                        <a:t>Tier</a:t>
+                      </a:r>
+                    </a:p>
+                  </a:txBody>
+                  <a:tcPr/>
+                </a:tc>
+                <a:tc>
+                  <a:txBody>
+                    <a:bodyPr/>
+                    <a:lstStyle/>
+                    <a:p>
+                      <a:r>
+                        <a:rPr lang="en-US" dirty="0"/>
+                        <a:t>Connections / </a:t>
+                      </a:r>
+                    </a:p>
+                    <a:p>
+                      <a:r>
+                        <a:rPr lang="en-US" dirty="0"/>
+                        <a:t>instance</a:t>
+                      </a:r>
+                    </a:p>
+                  </a:txBody>
+                  <a:tcPr/>
+                </a:tc>
+                <a:tc>
+                  <a:txBody>
+                    <a:bodyPr/>
+                    <a:lstStyle/>
+                    <a:p>
+                      <a:r>
+                        <a:rPr lang="en-US" dirty="0"/>
+                        <a:t>Max. </a:t>
+                      </a:r>
+                    </a:p>
+                    <a:p>
+                      <a:r>
+                        <a:rPr lang="en-US" dirty="0"/>
+                        <a:t>instances</a:t>
+                      </a:r>
+                    </a:p>
+                  </a:txBody>
+                  <a:tcPr/>
+                </a:tc>
+                <a:tc>
+                  <a:txBody>
+                    <a:bodyPr/>
+                    <a:lstStyle/>
+                    <a:p>
+                      <a:r>
+                        <a:rPr lang="en-US" dirty="0"/>
+                        <a:t>Price /  instance / hr.</a:t>
+                      </a:r>
+                    </a:p>
+                  </a:txBody>
+                  <a:tcPr/>
+                </a:tc>
+                <a:extLst>
+                  <a:ext uri="{0D108BD9-81ED-4DB2-BD59-A6C34878D82A}">
+                    <a16:rowId xmlns:a16="http://schemas.microsoft.com/office/drawing/2014/main" val="753680950"/>
+                  </a:ext>
+                </a:extLst>
+              </a:tr>
+              <a:tr h="370840">
+                <a:tc gridSpan="4">
+                  <a:txBody>
+                    <a:bodyPr/>
+                    <a:lstStyle/>
+                    <a:p>
+                      <a:r>
+                        <a:rPr lang="en-US" b="1" dirty="0"/>
+                        <a:t>Azure App Service</a:t>
+                      </a:r>
+                    </a:p>
+                  </a:txBody>
+                  <a:tcPr/>
+                </a:tc>
+                <a:tc hMerge="1">
+                  <a:txBody>
+                    <a:bodyPr/>
+                    <a:lstStyle/>
+                    <a:p>
+                      <a:endParaRPr lang="en-US" dirty="0"/>
+                    </a:p>
+                  </a:txBody>
+                  <a:tcPr/>
+                </a:tc>
+                <a:tc hMerge="1">
+                  <a:txBody>
+                    <a:bodyPr/>
+                    <a:lstStyle/>
+                    <a:p>
+                      <a:endParaRPr lang="en-US" dirty="0"/>
+                    </a:p>
+                  </a:txBody>
+                  <a:tcPr/>
+                </a:tc>
+                <a:tc hMerge="1">
+                  <a:txBody>
+                    <a:bodyPr/>
+                    <a:lstStyle/>
+                    <a:p>
+                      <a:endParaRPr lang="en-US" dirty="0"/>
+                    </a:p>
+                  </a:txBody>
+                  <a:tcPr/>
+                </a:tc>
+                <a:extLst>
+                  <a:ext uri="{0D108BD9-81ED-4DB2-BD59-A6C34878D82A}">
+                    <a16:rowId xmlns:a16="http://schemas.microsoft.com/office/drawing/2014/main" val="2316500764"/>
+                  </a:ext>
+                </a:extLst>
+              </a:tr>
+              <a:tr h="370840">
+                <a:tc>
+                  <a:txBody>
+                    <a:bodyPr/>
+                    <a:lstStyle/>
+                    <a:p>
+                      <a:r>
+                        <a:rPr lang="en-US" dirty="0"/>
+                        <a:t>Free</a:t>
+                      </a:r>
+                    </a:p>
+                  </a:txBody>
+                  <a:tcPr/>
+                </a:tc>
+                <a:tc>
+                  <a:txBody>
+                    <a:bodyPr/>
+                    <a:lstStyle/>
+                    <a:p>
+                      <a:r>
+                        <a:rPr lang="en-US" dirty="0"/>
+                        <a:t>5</a:t>
+                      </a:r>
+                    </a:p>
+                  </a:txBody>
+                  <a:tcPr/>
+                </a:tc>
+                <a:tc>
+                  <a:txBody>
+                    <a:bodyPr/>
+                    <a:lstStyle/>
+                    <a:p>
+                      <a:r>
+                        <a:rPr lang="en-US" dirty="0"/>
+                        <a:t>1</a:t>
+                      </a:r>
+                    </a:p>
+                  </a:txBody>
+                  <a:tcPr/>
+                </a:tc>
+                <a:tc>
+                  <a:txBody>
+                    <a:bodyPr/>
+                    <a:lstStyle/>
+                    <a:p>
+                      <a:r>
+                        <a:rPr lang="en-US" dirty="0"/>
+                        <a:t>$0.00</a:t>
+                      </a:r>
+                    </a:p>
+                  </a:txBody>
+                  <a:tcPr/>
+                </a:tc>
+                <a:extLst>
+                  <a:ext uri="{0D108BD9-81ED-4DB2-BD59-A6C34878D82A}">
+                    <a16:rowId xmlns:a16="http://schemas.microsoft.com/office/drawing/2014/main" val="615437511"/>
+                  </a:ext>
+                </a:extLst>
+              </a:tr>
+              <a:tr h="370840">
+                <a:tc>
+                  <a:txBody>
+                    <a:bodyPr/>
+                    <a:lstStyle/>
+                    <a:p>
+                      <a:r>
+                        <a:rPr lang="en-US" dirty="0"/>
+                        <a:t>Shared</a:t>
+                      </a:r>
+                    </a:p>
+                  </a:txBody>
+                  <a:tcPr/>
+                </a:tc>
+                <a:tc>
+                  <a:txBody>
+                    <a:bodyPr/>
+                    <a:lstStyle/>
+                    <a:p>
+                      <a:r>
+                        <a:rPr lang="en-US" dirty="0"/>
+                        <a:t>35</a:t>
+                      </a:r>
+                    </a:p>
+                  </a:txBody>
+                  <a:tcPr/>
+                </a:tc>
+                <a:tc>
+                  <a:txBody>
+                    <a:bodyPr/>
+                    <a:lstStyle/>
+                    <a:p>
+                      <a:r>
+                        <a:rPr lang="en-US" dirty="0"/>
+                        <a:t>1</a:t>
+                      </a:r>
+                    </a:p>
+                  </a:txBody>
+                  <a:tcPr/>
+                </a:tc>
+                <a:tc>
+                  <a:txBody>
+                    <a:bodyPr/>
+                    <a:lstStyle/>
+                    <a:p>
+                      <a:r>
+                        <a:rPr lang="en-US" dirty="0"/>
+                        <a:t>$0.013</a:t>
+                      </a:r>
+                    </a:p>
+                  </a:txBody>
+                  <a:tcPr/>
+                </a:tc>
+                <a:extLst>
+                  <a:ext uri="{0D108BD9-81ED-4DB2-BD59-A6C34878D82A}">
+                    <a16:rowId xmlns:a16="http://schemas.microsoft.com/office/drawing/2014/main" val="1588653178"/>
+                  </a:ext>
+                </a:extLst>
+              </a:tr>
+              <a:tr h="370840">
+                <a:tc>
+                  <a:txBody>
+                    <a:bodyPr/>
+                    <a:lstStyle/>
+                    <a:p>
+                      <a:r>
+                        <a:rPr lang="en-US" dirty="0"/>
+                        <a:t>Basic</a:t>
+                      </a:r>
+                    </a:p>
+                  </a:txBody>
+                  <a:tcPr/>
+                </a:tc>
+                <a:tc>
+                  <a:txBody>
+                    <a:bodyPr/>
+                    <a:lstStyle/>
+                    <a:p>
+                      <a:r>
+                        <a:rPr lang="en-US" dirty="0"/>
+                        <a:t>350</a:t>
+                      </a:r>
+                    </a:p>
+                  </a:txBody>
+                  <a:tcPr/>
+                </a:tc>
+                <a:tc>
+                  <a:txBody>
+                    <a:bodyPr/>
+                    <a:lstStyle/>
+                    <a:p>
+                      <a:r>
+                        <a:rPr lang="en-US" dirty="0"/>
+                        <a:t>3</a:t>
+                      </a:r>
+                    </a:p>
+                  </a:txBody>
+                  <a:tcPr/>
+                </a:tc>
+                <a:tc>
+                  <a:txBody>
+                    <a:bodyPr/>
+                    <a:lstStyle/>
+                    <a:p>
+                      <a:r>
+                        <a:rPr lang="en-US" dirty="0"/>
+                        <a:t>$0.075</a:t>
+                      </a:r>
+                    </a:p>
+                  </a:txBody>
+                  <a:tcPr/>
+                </a:tc>
+                <a:extLst>
+                  <a:ext uri="{0D108BD9-81ED-4DB2-BD59-A6C34878D82A}">
+                    <a16:rowId xmlns:a16="http://schemas.microsoft.com/office/drawing/2014/main" val="4150631001"/>
+                  </a:ext>
+                </a:extLst>
+              </a:tr>
+              <a:tr h="370840">
+                <a:tc>
+                  <a:txBody>
+                    <a:bodyPr/>
+                    <a:lstStyle/>
+                    <a:p>
+                      <a:r>
+                        <a:rPr lang="en-US" dirty="0"/>
+                        <a:t>Standard</a:t>
+                      </a:r>
+                    </a:p>
+                  </a:txBody>
+                  <a:tcPr/>
+                </a:tc>
+                <a:tc>
+                  <a:txBody>
+                    <a:bodyPr/>
+                    <a:lstStyle/>
+                    <a:p>
+                      <a:r>
+                        <a:rPr lang="en-US" dirty="0"/>
+                        <a:t>Unlimited</a:t>
+                      </a:r>
+                    </a:p>
+                  </a:txBody>
+                  <a:tcPr/>
+                </a:tc>
+                <a:tc>
+                  <a:txBody>
+                    <a:bodyPr/>
+                    <a:lstStyle/>
+                    <a:p>
+                      <a:r>
+                        <a:rPr lang="en-US" dirty="0"/>
+                        <a:t>10</a:t>
+                      </a:r>
+                    </a:p>
+                  </a:txBody>
+                  <a:tcPr/>
+                </a:tc>
+                <a:tc>
+                  <a:txBody>
+                    <a:bodyPr/>
+                    <a:lstStyle/>
+                    <a:p>
+                      <a:r>
+                        <a:rPr lang="en-US" dirty="0"/>
+                        <a:t>$0.10</a:t>
+                      </a:r>
+                    </a:p>
+                  </a:txBody>
+                  <a:tcPr/>
+                </a:tc>
+                <a:extLst>
+                  <a:ext uri="{0D108BD9-81ED-4DB2-BD59-A6C34878D82A}">
+                    <a16:rowId xmlns:a16="http://schemas.microsoft.com/office/drawing/2014/main" val="3549813139"/>
+                  </a:ext>
+                </a:extLst>
+              </a:tr>
+              <a:tr h="370840">
+                <a:tc>
+                  <a:txBody>
+                    <a:bodyPr/>
+                    <a:lstStyle/>
+                    <a:p>
+                      <a:r>
+                        <a:rPr lang="en-US" dirty="0"/>
+                        <a:t>Premium</a:t>
+                      </a:r>
+                    </a:p>
+                  </a:txBody>
+                  <a:tcPr/>
+                </a:tc>
+                <a:tc>
+                  <a:txBody>
+                    <a:bodyPr/>
+                    <a:lstStyle/>
+                    <a:p>
+                      <a:r>
+                        <a:rPr lang="en-US" dirty="0"/>
+                        <a:t>Unlimited</a:t>
+                      </a:r>
+                    </a:p>
+                  </a:txBody>
+                  <a:tcPr/>
+                </a:tc>
+                <a:tc>
+                  <a:txBody>
+                    <a:bodyPr/>
+                    <a:lstStyle/>
+                    <a:p>
+                      <a:r>
+                        <a:rPr lang="en-US" dirty="0"/>
+                        <a:t>20</a:t>
+                      </a:r>
+                    </a:p>
+                  </a:txBody>
+                  <a:tcPr/>
+                </a:tc>
+                <a:tc>
+                  <a:txBody>
+                    <a:bodyPr/>
+                    <a:lstStyle/>
+                    <a:p>
+                      <a:r>
+                        <a:rPr lang="en-US" dirty="0"/>
+                        <a:t>$0.20</a:t>
+                      </a:r>
+                    </a:p>
+                  </a:txBody>
+                  <a:tcPr/>
+                </a:tc>
+                <a:extLst>
+                  <a:ext uri="{0D108BD9-81ED-4DB2-BD59-A6C34878D82A}">
+                    <a16:rowId xmlns:a16="http://schemas.microsoft.com/office/drawing/2014/main" val="1377941706"/>
+                  </a:ext>
+                </a:extLst>
+              </a:tr>
+              <a:tr h="370840">
+                <a:tc>
+                  <a:txBody>
+                    <a:bodyPr/>
+                    <a:lstStyle/>
+                    <a:p>
+                      <a:r>
+                        <a:rPr lang="en-US" dirty="0"/>
+                        <a:t>Isolated</a:t>
+                      </a:r>
+                    </a:p>
+                  </a:txBody>
+                  <a:tcPr/>
+                </a:tc>
+                <a:tc>
+                  <a:txBody>
+                    <a:bodyPr/>
+                    <a:lstStyle/>
+                    <a:p>
+                      <a:r>
+                        <a:rPr lang="en-US" dirty="0"/>
+                        <a:t>Unlimited</a:t>
+                      </a:r>
+                    </a:p>
+                  </a:txBody>
+                  <a:tcPr/>
+                </a:tc>
+                <a:tc>
+                  <a:txBody>
+                    <a:bodyPr/>
+                    <a:lstStyle/>
+                    <a:p>
+                      <a:r>
+                        <a:rPr lang="en-US" dirty="0"/>
+                        <a:t>100</a:t>
+                      </a:r>
+                    </a:p>
+                  </a:txBody>
+                  <a:tcPr/>
+                </a:tc>
+                <a:tc>
+                  <a:txBody>
+                    <a:bodyPr/>
+                    <a:lstStyle/>
+                    <a:p>
+                      <a:r>
+                        <a:rPr lang="en-US" dirty="0"/>
+                        <a:t>$0.40</a:t>
+                      </a:r>
+                    </a:p>
+                  </a:txBody>
+                  <a:tcPr/>
+                </a:tc>
+                <a:extLst>
+                  <a:ext uri="{0D108BD9-81ED-4DB2-BD59-A6C34878D82A}">
+                    <a16:rowId xmlns:a16="http://schemas.microsoft.com/office/drawing/2014/main" val="1156317090"/>
+                  </a:ext>
+                </a:extLst>
+              </a:tr>
+              <a:tr h="370840">
+                <a:tc gridSpan="4">
+                  <a:txBody>
+                    <a:bodyPr/>
+                    <a:lstStyle/>
+                    <a:p>
+                      <a:r>
+                        <a:rPr lang="en-US" b="1" dirty="0"/>
+                        <a:t>Azure </a:t>
+                      </a:r>
+                      <a:r>
+                        <a:rPr lang="en-US" b="1" dirty="0" err="1"/>
+                        <a:t>SignalR</a:t>
+                      </a:r>
+                      <a:r>
+                        <a:rPr lang="en-US" b="1" dirty="0"/>
+                        <a:t> Service</a:t>
+                      </a:r>
+                    </a:p>
+                  </a:txBody>
+                  <a:tcPr/>
+                </a:tc>
+                <a:tc hMerge="1">
+                  <a:txBody>
+                    <a:bodyPr/>
+                    <a:lstStyle/>
+                    <a:p>
+                      <a:endParaRPr lang="en-US" dirty="0"/>
+                    </a:p>
+                  </a:txBody>
+                  <a:tcPr/>
+                </a:tc>
+                <a:tc hMerge="1">
+                  <a:txBody>
+                    <a:bodyPr/>
+                    <a:lstStyle/>
+                    <a:p>
+                      <a:endParaRPr lang="en-US" dirty="0"/>
+                    </a:p>
+                  </a:txBody>
+                  <a:tcPr/>
+                </a:tc>
+                <a:tc hMerge="1">
+                  <a:txBody>
+                    <a:bodyPr/>
+                    <a:lstStyle/>
+                    <a:p>
+                      <a:endParaRPr lang="en-US" dirty="0"/>
+                    </a:p>
+                  </a:txBody>
+                  <a:tcPr/>
+                </a:tc>
+                <a:extLst>
+                  <a:ext uri="{0D108BD9-81ED-4DB2-BD59-A6C34878D82A}">
+                    <a16:rowId xmlns:a16="http://schemas.microsoft.com/office/drawing/2014/main" val="2070924148"/>
+                  </a:ext>
+                </a:extLst>
+              </a:tr>
+              <a:tr h="370840">
+                <a:tc>
+                  <a:txBody>
+                    <a:bodyPr/>
+                    <a:lstStyle/>
+                    <a:p>
+                      <a:r>
+                        <a:rPr lang="en-US" dirty="0"/>
+                        <a:t>Free</a:t>
+                      </a:r>
+                    </a:p>
+                  </a:txBody>
+                  <a:tcPr/>
+                </a:tc>
+                <a:tc>
+                  <a:txBody>
+                    <a:bodyPr/>
+                    <a:lstStyle/>
+                    <a:p>
+                      <a:r>
+                        <a:rPr lang="en-US" dirty="0"/>
+                        <a:t>20</a:t>
+                      </a:r>
+                    </a:p>
+                  </a:txBody>
+                  <a:tcPr/>
+                </a:tc>
+                <a:tc>
+                  <a:txBody>
+                    <a:bodyPr/>
+                    <a:lstStyle/>
+                    <a:p>
+                      <a:r>
+                        <a:rPr lang="en-US" dirty="0"/>
+                        <a:t>1</a:t>
+                      </a:r>
+                    </a:p>
+                  </a:txBody>
+                  <a:tcPr/>
+                </a:tc>
+                <a:tc>
+                  <a:txBody>
+                    <a:bodyPr/>
+                    <a:lstStyle/>
+                    <a:p>
+                      <a:r>
+                        <a:rPr lang="en-US" dirty="0"/>
+                        <a:t>$0.00</a:t>
+                      </a:r>
+                    </a:p>
+                  </a:txBody>
+                  <a:tcPr/>
+                </a:tc>
+                <a:extLst>
+                  <a:ext uri="{0D108BD9-81ED-4DB2-BD59-A6C34878D82A}">
+                    <a16:rowId xmlns:a16="http://schemas.microsoft.com/office/drawing/2014/main" val="2425091680"/>
+                  </a:ext>
+                </a:extLst>
+              </a:tr>
+              <a:tr h="370840">
+                <a:tc>
+                  <a:txBody>
+                    <a:bodyPr/>
+                    <a:lstStyle/>
+                    <a:p>
+                      <a:r>
+                        <a:rPr lang="en-US" dirty="0"/>
+                        <a:t>Standard</a:t>
+                      </a:r>
+                    </a:p>
+                  </a:txBody>
+                  <a:tcPr/>
+                </a:tc>
+                <a:tc>
+                  <a:txBody>
+                    <a:bodyPr/>
+                    <a:lstStyle/>
+                    <a:p>
+                      <a:r>
+                        <a:rPr lang="en-US" dirty="0"/>
+                        <a:t>1,000</a:t>
+                      </a:r>
+                    </a:p>
+                  </a:txBody>
+                  <a:tcPr/>
+                </a:tc>
+                <a:tc>
+                  <a:txBody>
+                    <a:bodyPr/>
+                    <a:lstStyle/>
+                    <a:p>
+                      <a:r>
+                        <a:rPr lang="en-US" dirty="0"/>
+                        <a:t>100</a:t>
+                      </a:r>
+                    </a:p>
+                  </a:txBody>
+                  <a:tcPr/>
+                </a:tc>
+                <a:tc>
+                  <a:txBody>
+                    <a:bodyPr/>
+                    <a:lstStyle/>
+                    <a:p>
+                      <a:r>
+                        <a:rPr lang="en-US" dirty="0"/>
+                        <a:t>$0.0335</a:t>
+                      </a:r>
+                    </a:p>
+                  </a:txBody>
+                  <a:tcPr/>
+                </a:tc>
+                <a:extLst>
+                  <a:ext uri="{0D108BD9-81ED-4DB2-BD59-A6C34878D82A}">
+                    <a16:rowId xmlns:a16="http://schemas.microsoft.com/office/drawing/2014/main" val="1125489439"/>
+                  </a:ext>
+                </a:extLst>
+              </a:tr>
+            </a:tbl>
+          </a:graphicData>
+        </a:graphic>
+      </p:graphicFrame>
+      <p:pic>
+        <p:nvPicPr>
+          <p:cNvPr id="6" name="Picture 5" descr="A close up of a logo&#10;&#10;Description automatically generated">
+            <a:extLst>
+              <a:ext uri="{FF2B5EF4-FFF2-40B4-BE49-F238E27FC236}">
+                <a16:creationId xmlns:a16="http://schemas.microsoft.com/office/drawing/2014/main" id="{FDB27AB9-D127-4653-B3EF-9DF6AA70A5C0}"/>
+              </a:ext>
+            </a:extLst>
+          </p:cNvPr>
+          <p:cNvPicPr>
+            <a:picLocks noChangeAspect="1"/>
+          </p:cNvPicPr>
+          <p:nvPr/>
+        </p:nvPicPr>
+        <p:blipFill>
+          <a:blip r:embed="rId4" cstate="print">
+            <a:extLst>
+              <a:ext uri="{28A0092B-C50C-407E-A947-70E740481C1C}">
+                <a14:useLocalDpi xmlns:a14="http://schemas.microsoft.com/office/drawing/2010/main" val="0"/>
+              </a:ext>
+            </a:extLst>
+          </a:blip>
+          <a:stretch>
+            <a:fillRect/>
+          </a:stretch>
+        </p:blipFill>
+        <p:spPr>
+          <a:xfrm>
+            <a:off x="513307" y="1182498"/>
+            <a:ext cx="780290" cy="780290"/>
+          </a:xfrm>
+          <a:prstGeom prst="rect">
+            <a:avLst/>
+          </a:prstGeom>
+        </p:spPr>
+      </p:pic>
+      <p:cxnSp>
+        <p:nvCxnSpPr>
+          <p:cNvPr id="10" name="Straight Connector 9">
+            <a:extLst>
+              <a:ext uri="{FF2B5EF4-FFF2-40B4-BE49-F238E27FC236}">
+                <a16:creationId xmlns:a16="http://schemas.microsoft.com/office/drawing/2014/main" id="{EACC3DA4-CCD2-4E5F-B8F7-93920727582C}"/>
+              </a:ext>
+            </a:extLst>
+          </p:cNvPr>
+          <p:cNvCxnSpPr>
+            <a:cxnSpLocks/>
+          </p:cNvCxnSpPr>
+          <p:nvPr/>
+        </p:nvCxnSpPr>
+        <p:spPr>
+          <a:xfrm>
+            <a:off x="1374254" y="1527858"/>
+            <a:ext cx="4621432" cy="0"/>
+          </a:xfrm>
+          <a:prstGeom prst="line">
+            <a:avLst/>
+          </a:prstGeom>
+          <a:ln w="38100">
+            <a:solidFill>
+              <a:schemeClr val="tx1"/>
+            </a:solidFill>
+            <a:headEnd type="none"/>
+            <a:tailEnd type="none"/>
+          </a:ln>
+        </p:spPr>
+        <p:style>
+          <a:lnRef idx="1">
+            <a:schemeClr val="accent1"/>
+          </a:lnRef>
+          <a:fillRef idx="0">
+            <a:schemeClr val="accent1"/>
+          </a:fillRef>
+          <a:effectRef idx="0">
+            <a:schemeClr val="accent1"/>
+          </a:effectRef>
+          <a:fontRef idx="minor">
+            <a:schemeClr val="tx1"/>
+          </a:fontRef>
+        </p:style>
+      </p:cxnSp>
+      <p:cxnSp>
+        <p:nvCxnSpPr>
+          <p:cNvPr id="13" name="Straight Connector 12">
+            <a:extLst>
+              <a:ext uri="{FF2B5EF4-FFF2-40B4-BE49-F238E27FC236}">
+                <a16:creationId xmlns:a16="http://schemas.microsoft.com/office/drawing/2014/main" id="{8C5AC474-085B-43EC-8335-74E88AF3E9B0}"/>
+              </a:ext>
+            </a:extLst>
+          </p:cNvPr>
+          <p:cNvCxnSpPr>
+            <a:cxnSpLocks/>
+          </p:cNvCxnSpPr>
+          <p:nvPr/>
+        </p:nvCxnSpPr>
+        <p:spPr>
+          <a:xfrm>
+            <a:off x="1374254" y="3393311"/>
+            <a:ext cx="4621432" cy="0"/>
+          </a:xfrm>
+          <a:prstGeom prst="line">
+            <a:avLst/>
+          </a:prstGeom>
+          <a:ln w="38100">
+            <a:solidFill>
+              <a:schemeClr val="tx1"/>
+            </a:solidFill>
+            <a:headEnd type="none"/>
+            <a:tailEnd type="none"/>
+          </a:ln>
+        </p:spPr>
+        <p:style>
+          <a:lnRef idx="1">
+            <a:schemeClr val="accent1"/>
+          </a:lnRef>
+          <a:fillRef idx="0">
+            <a:schemeClr val="accent1"/>
+          </a:fillRef>
+          <a:effectRef idx="0">
+            <a:schemeClr val="accent1"/>
+          </a:effectRef>
+          <a:fontRef idx="minor">
+            <a:schemeClr val="tx1"/>
+          </a:fontRef>
+        </p:style>
+      </p:cxnSp>
+      <p:graphicFrame>
+        <p:nvGraphicFramePr>
+          <p:cNvPr id="12" name="Table 11">
+            <a:extLst>
+              <a:ext uri="{FF2B5EF4-FFF2-40B4-BE49-F238E27FC236}">
+                <a16:creationId xmlns:a16="http://schemas.microsoft.com/office/drawing/2014/main" id="{003B3AE4-7237-4976-A8D5-0953DE8B36B5}"/>
+              </a:ext>
+            </a:extLst>
+          </p:cNvPr>
+          <p:cNvGraphicFramePr>
+            <a:graphicFrameLocks noGrp="1"/>
+          </p:cNvGraphicFramePr>
+          <p:nvPr>
+            <p:extLst>
+              <p:ext uri="{D42A27DB-BD31-4B8C-83A1-F6EECF244321}">
+                <p14:modId xmlns:p14="http://schemas.microsoft.com/office/powerpoint/2010/main" val="960109405"/>
+              </p:ext>
+            </p:extLst>
+          </p:nvPr>
+        </p:nvGraphicFramePr>
+        <p:xfrm>
+          <a:off x="3356658" y="4739124"/>
+          <a:ext cx="3079745" cy="1112520"/>
+        </p:xfrm>
+        <a:graphic>
+          <a:graphicData uri="http://schemas.openxmlformats.org/drawingml/2006/table">
+            <a:tbl>
+              <a:tblPr firstRow="1" bandRow="1">
+                <a:tableStyleId>{69CF1AB2-1976-4502-BF36-3FF5EA218861}</a:tableStyleId>
+              </a:tblPr>
+              <a:tblGrid>
+                <a:gridCol w="3079745">
+                  <a:extLst>
+                    <a:ext uri="{9D8B030D-6E8A-4147-A177-3AD203B41FA5}">
+                      <a16:colId xmlns:a16="http://schemas.microsoft.com/office/drawing/2014/main" val="2618534296"/>
+                    </a:ext>
+                  </a:extLst>
+                </a:gridCol>
+              </a:tblGrid>
+              <a:tr h="370840">
+                <a:tc>
+                  <a:txBody>
+                    <a:bodyPr/>
+                    <a:lstStyle/>
+                    <a:p>
+                      <a:r>
+                        <a:rPr lang="en-US" dirty="0"/>
+                        <a:t>Messages / instance / day</a:t>
+                      </a:r>
+                    </a:p>
+                  </a:txBody>
+                  <a:tcPr/>
+                </a:tc>
+                <a:extLst>
+                  <a:ext uri="{0D108BD9-81ED-4DB2-BD59-A6C34878D82A}">
+                    <a16:rowId xmlns:a16="http://schemas.microsoft.com/office/drawing/2014/main" val="1516665460"/>
+                  </a:ext>
+                </a:extLst>
+              </a:tr>
+              <a:tr h="370840">
+                <a:tc>
+                  <a:txBody>
+                    <a:bodyPr/>
+                    <a:lstStyle/>
+                    <a:p>
+                      <a:r>
+                        <a:rPr lang="en-US" dirty="0"/>
+                        <a:t>20,000</a:t>
+                      </a:r>
+                    </a:p>
+                  </a:txBody>
+                  <a:tcPr/>
+                </a:tc>
+                <a:extLst>
+                  <a:ext uri="{0D108BD9-81ED-4DB2-BD59-A6C34878D82A}">
+                    <a16:rowId xmlns:a16="http://schemas.microsoft.com/office/drawing/2014/main" val="2230356435"/>
+                  </a:ext>
+                </a:extLst>
+              </a:tr>
+              <a:tr h="370840">
+                <a:tc>
+                  <a:txBody>
+                    <a:bodyPr/>
+                    <a:lstStyle/>
+                    <a:p>
+                      <a:r>
+                        <a:rPr lang="en-US" dirty="0"/>
+                        <a:t>1,000,000</a:t>
+                      </a:r>
+                    </a:p>
+                  </a:txBody>
+                  <a:tcPr/>
+                </a:tc>
+                <a:extLst>
+                  <a:ext uri="{0D108BD9-81ED-4DB2-BD59-A6C34878D82A}">
+                    <a16:rowId xmlns:a16="http://schemas.microsoft.com/office/drawing/2014/main" val="2605954350"/>
+                  </a:ext>
+                </a:extLst>
+              </a:tr>
+            </a:tbl>
+          </a:graphicData>
+        </a:graphic>
+      </p:graphicFrame>
+    </p:spTree>
+    <p:extLst>
+      <p:ext uri="{BB962C8B-B14F-4D97-AF65-F5344CB8AC3E}">
+        <p14:creationId xmlns:p14="http://schemas.microsoft.com/office/powerpoint/2010/main" val="430563725"/>
+      </p:ext>
+    </p:extLst>
+  </p:cSld>
+  <p:clrMapOvr>
+    <a:masterClrMapping/>
+  </p:clrMapOvr>
+  <p:transition>
+    <p:fade/>
+  </p:transition>
+</p:sld>
+</file>
+
+<file path=ppt/slides/slide13.xml><?xml version="1.0" encoding="utf-8"?>
 <p:sld xmlns:a="http://schemas.openxmlformats.org/drawingml/2006/main" xmlns:r="http://schemas.openxmlformats.org/officeDocument/2006/relationships" xmlns:p="http://schemas.openxmlformats.org/presentationml/2006/main">
   <p:cSld>
     <p:spTree>
@@ -29439,46 +30691,6 @@
 </file>
 
 <file path=customXml/item1.xml><?xml version="1.0" encoding="utf-8"?>
-<?mso-contentType ?>
-<FormTemplates xmlns="http://schemas.microsoft.com/sharepoint/v3/contenttype/forms">
-  <Display>DocumentLibraryForm</Display>
-  <Edit>DocumentLibraryForm</Edit>
-  <New>DocumentLibraryForm</New>
-</FormTemplates>
-</file>
-
-<file path=customXml/item2.xml><?xml version="1.0" encoding="utf-8"?>
-<p:properties xmlns:p="http://schemas.microsoft.com/office/2006/metadata/properties" xmlns:xsi="http://www.w3.org/2001/XMLSchema-instance" xmlns:pc="http://schemas.microsoft.com/office/infopath/2007/PartnerControls">
-  <documentManagement>
-    <_ip_UnifiedCompliancePolicyUIAction xmlns="http://schemas.microsoft.com/sharepoint/v3" xsi:nil="true"/>
-    <IconOverlay xmlns="http://schemas.microsoft.com/sharepoint/v4" xsi:nil="true"/>
-    <Preview xmlns="15c98cf3-0896-4040-874f-f436925621df">
-      <Url xsi:nil="true"/>
-      <Description xsi:nil="true"/>
-    </Preview>
-    <_ip_UnifiedCompliancePolicyProperties xmlns="http://schemas.microsoft.com/sharepoint/v3" xsi:nil="true"/>
-    <SharedWithUsers xmlns="af610f50-4aee-43ff-9d65-64420adb70d2">
-      <UserInfo>
-        <DisplayName>Shriram Natarajan</DisplayName>
-        <AccountId>645</AccountId>
-        <AccountType/>
-      </UserInfo>
-      <UserInfo>
-        <DisplayName>Siddique Juman</DisplayName>
-        <AccountId>79219</AccountId>
-        <AccountType/>
-      </UserInfo>
-      <UserInfo>
-        <DisplayName>Tiberiu Radu</DisplayName>
-        <AccountId>42551</AccountId>
-        <AccountType/>
-      </UserInfo>
-    </SharedWithUsers>
-  </documentManagement>
-</p:properties>
-</file>
-
-<file path=customXml/item3.xml><?xml version="1.0" encoding="utf-8"?>
 <ct:contentTypeSchema xmlns:ct="http://schemas.microsoft.com/office/2006/metadata/contentType" xmlns:ma="http://schemas.microsoft.com/office/2006/metadata/properties/metaAttributes" ct:_="" ma:_="" ma:contentTypeName="Document" ma:contentTypeID="0x010100F5F187B9059DF945B25AB5B2F3BA0895" ma:contentTypeVersion="17" ma:contentTypeDescription="Create a new document." ma:contentTypeScope="" ma:versionID="454b11af52e6a4a001d7a94430b0600d">
   <xsd:schema xmlns:xsd="http://www.w3.org/2001/XMLSchema" xmlns:xs="http://www.w3.org/2001/XMLSchema" xmlns:p="http://schemas.microsoft.com/office/2006/metadata/properties" xmlns:ns1="http://schemas.microsoft.com/sharepoint/v3" xmlns:ns2="af610f50-4aee-43ff-9d65-64420adb70d2" xmlns:ns3="http://schemas.microsoft.com/sharepoint/v4" xmlns:ns4="15c98cf3-0896-4040-874f-f436925621df" targetNamespace="http://schemas.microsoft.com/office/2006/metadata/properties" ma:root="true" ma:fieldsID="94f54606d29a996f622cc5db0382967e" ns1:_="" ns2:_="" ns3:_="" ns4:_="">
     <xsd:import namespace="http://schemas.microsoft.com/sharepoint/v3"/>
@@ -29742,10 +30954,63 @@
 </ct:contentTypeSchema>
 </file>
 
+<file path=customXml/item2.xml><?xml version="1.0" encoding="utf-8"?>
+<p:properties xmlns:p="http://schemas.microsoft.com/office/2006/metadata/properties" xmlns:xsi="http://www.w3.org/2001/XMLSchema-instance" xmlns:pc="http://schemas.microsoft.com/office/infopath/2007/PartnerControls">
+  <documentManagement>
+    <_ip_UnifiedCompliancePolicyUIAction xmlns="http://schemas.microsoft.com/sharepoint/v3" xsi:nil="true"/>
+    <IconOverlay xmlns="http://schemas.microsoft.com/sharepoint/v4" xsi:nil="true"/>
+    <Preview xmlns="15c98cf3-0896-4040-874f-f436925621df">
+      <Url xsi:nil="true"/>
+      <Description xsi:nil="true"/>
+    </Preview>
+    <_ip_UnifiedCompliancePolicyProperties xmlns="http://schemas.microsoft.com/sharepoint/v3" xsi:nil="true"/>
+    <SharedWithUsers xmlns="af610f50-4aee-43ff-9d65-64420adb70d2">
+      <UserInfo>
+        <DisplayName>Shriram Natarajan</DisplayName>
+        <AccountId>645</AccountId>
+        <AccountType/>
+      </UserInfo>
+      <UserInfo>
+        <DisplayName>Siddique Juman</DisplayName>
+        <AccountId>79219</AccountId>
+        <AccountType/>
+      </UserInfo>
+      <UserInfo>
+        <DisplayName>Tiberiu Radu</DisplayName>
+        <AccountId>42551</AccountId>
+        <AccountType/>
+      </UserInfo>
+    </SharedWithUsers>
+  </documentManagement>
+</p:properties>
+</file>
+
+<file path=customXml/item3.xml><?xml version="1.0" encoding="utf-8"?>
+<?mso-contentType ?>
+<FormTemplates xmlns="http://schemas.microsoft.com/sharepoint/v3/contenttype/forms">
+  <Display>DocumentLibraryForm</Display>
+  <Edit>DocumentLibraryForm</Edit>
+  <New>DocumentLibraryForm</New>
+</FormTemplates>
+</file>
+
 <file path=customXml/itemProps1.xml><?xml version="1.0" encoding="utf-8"?>
-<ds:datastoreItem xmlns:ds="http://schemas.openxmlformats.org/officeDocument/2006/customXml" ds:itemID="{A0CFF515-FEE6-4B9C-8B96-C300A0063377}">
+<ds:datastoreItem xmlns:ds="http://schemas.openxmlformats.org/officeDocument/2006/customXml" ds:itemID="{366A0CB4-B94D-48B7-AE6B-3133538C8CAA}">
   <ds:schemaRefs>
-    <ds:schemaRef ds:uri="http://schemas.microsoft.com/sharepoint/v3/contenttype/forms"/>
+    <ds:schemaRef ds:uri="http://schemas.microsoft.com/office/2006/metadata/contentType"/>
+    <ds:schemaRef ds:uri="http://schemas.microsoft.com/office/2006/metadata/properties/metaAttributes"/>
+    <ds:schemaRef ds:uri="http://www.w3.org/2001/XMLSchema"/>
+    <ds:schemaRef ds:uri="http://schemas.microsoft.com/office/2006/metadata/properties"/>
+    <ds:schemaRef ds:uri="http://schemas.microsoft.com/sharepoint/v3"/>
+    <ds:schemaRef ds:uri="af610f50-4aee-43ff-9d65-64420adb70d2"/>
+    <ds:schemaRef ds:uri="http://schemas.microsoft.com/sharepoint/v4"/>
+    <ds:schemaRef ds:uri="15c98cf3-0896-4040-874f-f436925621df"/>
+    <ds:schemaRef ds:uri="http://schemas.microsoft.com/office/2006/documentManagement/types"/>
+    <ds:schemaRef ds:uri="http://schemas.microsoft.com/office/infopath/2007/PartnerControls"/>
+    <ds:schemaRef ds:uri="http://schemas.openxmlformats.org/package/2006/metadata/core-properties"/>
+    <ds:schemaRef ds:uri="http://purl.org/dc/elements/1.1/"/>
+    <ds:schemaRef ds:uri="http://purl.org/dc/terms/"/>
+    <ds:schemaRef ds:uri="http://schemas.microsoft.com/internal/obd"/>
   </ds:schemaRefs>
 </ds:datastoreItem>
 </file>
@@ -29770,22 +31035,9 @@
 </file>
 
 <file path=customXml/itemProps3.xml><?xml version="1.0" encoding="utf-8"?>
-<ds:datastoreItem xmlns:ds="http://schemas.openxmlformats.org/officeDocument/2006/customXml" ds:itemID="{366A0CB4-B94D-48B7-AE6B-3133538C8CAA}">
+<ds:datastoreItem xmlns:ds="http://schemas.openxmlformats.org/officeDocument/2006/customXml" ds:itemID="{A0CFF515-FEE6-4B9C-8B96-C300A0063377}">
   <ds:schemaRefs>
-    <ds:schemaRef ds:uri="http://schemas.microsoft.com/office/2006/metadata/contentType"/>
-    <ds:schemaRef ds:uri="http://schemas.microsoft.com/office/2006/metadata/properties/metaAttributes"/>
-    <ds:schemaRef ds:uri="http://www.w3.org/2001/XMLSchema"/>
-    <ds:schemaRef ds:uri="http://schemas.microsoft.com/office/2006/metadata/properties"/>
-    <ds:schemaRef ds:uri="http://schemas.microsoft.com/sharepoint/v3"/>
-    <ds:schemaRef ds:uri="af610f50-4aee-43ff-9d65-64420adb70d2"/>
-    <ds:schemaRef ds:uri="http://schemas.microsoft.com/sharepoint/v4"/>
-    <ds:schemaRef ds:uri="15c98cf3-0896-4040-874f-f436925621df"/>
-    <ds:schemaRef ds:uri="http://schemas.microsoft.com/office/2006/documentManagement/types"/>
-    <ds:schemaRef ds:uri="http://schemas.microsoft.com/office/infopath/2007/PartnerControls"/>
-    <ds:schemaRef ds:uri="http://schemas.openxmlformats.org/package/2006/metadata/core-properties"/>
-    <ds:schemaRef ds:uri="http://purl.org/dc/elements/1.1/"/>
-    <ds:schemaRef ds:uri="http://purl.org/dc/terms/"/>
-    <ds:schemaRef ds:uri="http://schemas.microsoft.com/internal/obd"/>
+    <ds:schemaRef ds:uri="http://schemas.microsoft.com/sharepoint/v3/contenttype/forms"/>
   </ds:schemaRefs>
 </ds:datastoreItem>
 </file>
</xml_diff>